<commit_message>
Added software architecture diagram
</commit_message>
<xml_diff>
--- a/PlantBuddy.pptx
+++ b/PlantBuddy.pptx
@@ -8098,25 +8098,41 @@
           </a:p>
         </p:txBody>
       </p:sp>
-      <p:sp>
-        <p:nvSpPr>
-          <p:cNvPr id="3" name="Content Placeholder 2"/>
-          <p:cNvSpPr>
-            <a:spLocks noGrp="1"/>
-          </p:cNvSpPr>
-          <p:nvPr>
-            <p:ph idx="1"/>
-          </p:nvPr>
-        </p:nvSpPr>
-        <p:spPr/>
-        <p:txBody>
-          <a:bodyPr/>
-          <a:lstStyle/>
-          <a:p>
-            <a:endParaRPr lang="en-CA"/>
-          </a:p>
-        </p:txBody>
-      </p:sp>
+      <p:pic>
+        <p:nvPicPr>
+          <p:cNvPr id="11" name="Picture 10">
+            <a:extLst>
+              <a:ext uri="{FF2B5EF4-FFF2-40B4-BE49-F238E27FC236}">
+                <a16:creationId xmlns:a16="http://schemas.microsoft.com/office/drawing/2014/main" id="{7A54F1B7-6513-4108-96D8-2530DE67E430}"/>
+              </a:ext>
+            </a:extLst>
+          </p:cNvPr>
+          <p:cNvPicPr>
+            <a:picLocks noChangeAspect="1"/>
+          </p:cNvPicPr>
+          <p:nvPr/>
+        </p:nvPicPr>
+        <p:blipFill rotWithShape="1">
+          <a:blip r:embed="rId3">
+            <a:extLst>
+              <a:ext uri="{28A0092B-C50C-407E-A947-70E740481C1C}">
+                <a14:useLocalDpi xmlns:a14="http://schemas.microsoft.com/office/drawing/2010/main" val="0"/>
+              </a:ext>
+            </a:extLst>
+          </a:blip>
+          <a:srcRect l="1394" t="2082" r="1493" b="1566"/>
+          <a:stretch/>
+        </p:blipFill>
+        <p:spPr>
+          <a:xfrm>
+            <a:off x="39038" y="764704"/>
+            <a:ext cx="7845330" cy="5760640"/>
+          </a:xfrm>
+          <a:prstGeom prst="rect">
+            <a:avLst/>
+          </a:prstGeom>
+        </p:spPr>
+      </p:pic>
     </p:spTree>
   </p:cSld>
   <p:clrMapOvr>

</xml_diff>

<commit_message>
done Feature 3 slide
</commit_message>
<xml_diff>
--- a/PlantBuddy.pptx
+++ b/PlantBuddy.pptx
@@ -8100,12 +8100,8 @@
       </p:sp>
       <p:pic>
         <p:nvPicPr>
-          <p:cNvPr id="11" name="Picture 10">
-            <a:extLst>
-              <a:ext uri="{FF2B5EF4-FFF2-40B4-BE49-F238E27FC236}">
-                <a16:creationId xmlns:a16="http://schemas.microsoft.com/office/drawing/2014/main" id="{7A54F1B7-6513-4108-96D8-2530DE67E430}"/>
-              </a:ext>
-            </a:extLst>
+          <p:cNvPr id="4" name="Picture 3">
+            <a:extLst/>
           </p:cNvPr>
           <p:cNvPicPr>
             <a:picLocks noChangeAspect="1"/>
@@ -8125,7 +8121,7 @@
         </p:blipFill>
         <p:spPr>
           <a:xfrm>
-            <a:off x="39038" y="764704"/>
+            <a:off x="35496" y="692696"/>
             <a:ext cx="7845330" cy="5760640"/>
           </a:xfrm>
           <a:prstGeom prst="rect">
@@ -8918,24 +8914,432 @@
             <p:ph idx="1"/>
           </p:nvPr>
         </p:nvSpPr>
-        <p:spPr/>
+        <p:spPr>
+          <a:xfrm>
+            <a:off x="-36512" y="2868491"/>
+            <a:ext cx="5616624" cy="2720749"/>
+          </a:xfrm>
+        </p:spPr>
         <p:txBody>
           <a:bodyPr/>
           <a:lstStyle/>
           <a:p>
             <a:r>
               <a:rPr lang="en-CA" dirty="0"/>
-              <a:t>Demo</a:t>
-            </a:r>
-          </a:p>
-          <a:p>
-            <a:r>
-              <a:rPr lang="en-CA" dirty="0"/>
               <a:t>How does it work?</a:t>
             </a:r>
           </a:p>
           <a:p>
+            <a:pPr lvl="1"/>
+            <a:r>
+              <a:rPr lang="en-CA" dirty="0"/>
+              <a:t>User’s plants retrieved and displayed</a:t>
+            </a:r>
+          </a:p>
+          <a:p>
+            <a:pPr lvl="1"/>
+            <a:r>
+              <a:rPr lang="en-CA" dirty="0"/>
+              <a:t>ON/OFF buttons set state for each plant in DB</a:t>
+            </a:r>
+          </a:p>
+          <a:p>
+            <a:pPr lvl="1"/>
+            <a:r>
+              <a:rPr lang="en-CA" dirty="0"/>
+              <a:t>Raspberry pi reads DB</a:t>
+            </a:r>
+          </a:p>
+          <a:p>
+            <a:pPr lvl="1"/>
+            <a:r>
+              <a:rPr lang="en-CA" dirty="0"/>
+              <a:t>Raspberry pi forwards state to Arduino</a:t>
+            </a:r>
+          </a:p>
+          <a:p>
+            <a:pPr lvl="1"/>
+            <a:r>
+              <a:rPr lang="en-CA" dirty="0"/>
+              <a:t>Arduino controls pump</a:t>
+            </a:r>
+          </a:p>
+          <a:p>
             <a:endParaRPr lang="en-CA" dirty="0"/>
+          </a:p>
+        </p:txBody>
+      </p:sp>
+      <p:pic>
+        <p:nvPicPr>
+          <p:cNvPr id="5" name="Picture 4"/>
+          <p:cNvPicPr>
+            <a:picLocks noChangeAspect="1"/>
+          </p:cNvPicPr>
+          <p:nvPr/>
+        </p:nvPicPr>
+        <p:blipFill rotWithShape="1">
+          <a:blip r:embed="rId3">
+            <a:extLst>
+              <a:ext uri="{28A0092B-C50C-407E-A947-70E740481C1C}">
+                <a14:useLocalDpi xmlns:a14="http://schemas.microsoft.com/office/drawing/2010/main" val="0"/>
+              </a:ext>
+            </a:extLst>
+          </a:blip>
+          <a:srcRect l="10626" t="22001" r="23623" b="40201"/>
+          <a:stretch/>
+        </p:blipFill>
+        <p:spPr>
+          <a:xfrm>
+            <a:off x="3257630" y="1307287"/>
+            <a:ext cx="5670346" cy="1833681"/>
+          </a:xfrm>
+          <a:prstGeom prst="rect">
+            <a:avLst/>
+          </a:prstGeom>
+        </p:spPr>
+      </p:pic>
+      <p:pic>
+        <p:nvPicPr>
+          <p:cNvPr id="7" name="Picture 6"/>
+          <p:cNvPicPr>
+            <a:picLocks noChangeAspect="1"/>
+          </p:cNvPicPr>
+          <p:nvPr/>
+        </p:nvPicPr>
+        <p:blipFill>
+          <a:blip r:embed="rId4">
+            <a:extLst>
+              <a:ext uri="{28A0092B-C50C-407E-A947-70E740481C1C}">
+                <a14:useLocalDpi xmlns:a14="http://schemas.microsoft.com/office/drawing/2010/main" val="0"/>
+              </a:ext>
+            </a:extLst>
+          </a:blip>
+          <a:stretch>
+            <a:fillRect/>
+          </a:stretch>
+        </p:blipFill>
+        <p:spPr>
+          <a:xfrm>
+            <a:off x="5738587" y="3521406"/>
+            <a:ext cx="1251014" cy="1485976"/>
+          </a:xfrm>
+          <a:prstGeom prst="rect">
+            <a:avLst/>
+          </a:prstGeom>
+        </p:spPr>
+      </p:pic>
+      <p:pic>
+        <p:nvPicPr>
+          <p:cNvPr id="9" name="Picture 8"/>
+          <p:cNvPicPr>
+            <a:picLocks noChangeAspect="1"/>
+          </p:cNvPicPr>
+          <p:nvPr/>
+        </p:nvPicPr>
+        <p:blipFill>
+          <a:blip r:embed="rId5">
+            <a:extLst>
+              <a:ext uri="{28A0092B-C50C-407E-A947-70E740481C1C}">
+                <a14:useLocalDpi xmlns:a14="http://schemas.microsoft.com/office/drawing/2010/main" val="0"/>
+              </a:ext>
+            </a:extLst>
+          </a:blip>
+          <a:stretch>
+            <a:fillRect/>
+          </a:stretch>
+        </p:blipFill>
+        <p:spPr>
+          <a:xfrm>
+            <a:off x="7678368" y="3545458"/>
+            <a:ext cx="1270065" cy="1447874"/>
+          </a:xfrm>
+          <a:prstGeom prst="rect">
+            <a:avLst/>
+          </a:prstGeom>
+        </p:spPr>
+      </p:pic>
+      <p:sp>
+        <p:nvSpPr>
+          <p:cNvPr id="13" name="Rectangle 12"/>
+          <p:cNvSpPr/>
+          <p:nvPr/>
+        </p:nvSpPr>
+        <p:spPr>
+          <a:xfrm>
+            <a:off x="6156176" y="3861048"/>
+            <a:ext cx="576064" cy="216024"/>
+          </a:xfrm>
+          <a:prstGeom prst="rect">
+            <a:avLst/>
+          </a:prstGeom>
+          <a:solidFill>
+            <a:srgbClr val="E80000">
+              <a:alpha val="25098"/>
+            </a:srgbClr>
+          </a:solidFill>
+        </p:spPr>
+        <p:style>
+          <a:lnRef idx="2">
+            <a:schemeClr val="accent1">
+              <a:shade val="50000"/>
+            </a:schemeClr>
+          </a:lnRef>
+          <a:fillRef idx="1">
+            <a:schemeClr val="accent1"/>
+          </a:fillRef>
+          <a:effectRef idx="0">
+            <a:schemeClr val="accent1"/>
+          </a:effectRef>
+          <a:fontRef idx="minor">
+            <a:schemeClr val="lt1"/>
+          </a:fontRef>
+        </p:style>
+        <p:txBody>
+          <a:bodyPr rtlCol="0" anchor="ctr"/>
+          <a:lstStyle/>
+          <a:p>
+            <a:pPr algn="ctr"/>
+            <a:endParaRPr lang="en-CA"/>
+          </a:p>
+        </p:txBody>
+      </p:sp>
+      <p:sp>
+        <p:nvSpPr>
+          <p:cNvPr id="14" name="Rectangle 13"/>
+          <p:cNvSpPr/>
+          <p:nvPr/>
+        </p:nvSpPr>
+        <p:spPr>
+          <a:xfrm>
+            <a:off x="8100392" y="3861048"/>
+            <a:ext cx="504056" cy="216024"/>
+          </a:xfrm>
+          <a:prstGeom prst="rect">
+            <a:avLst/>
+          </a:prstGeom>
+          <a:solidFill>
+            <a:srgbClr val="E80000">
+              <a:alpha val="25098"/>
+            </a:srgbClr>
+          </a:solidFill>
+        </p:spPr>
+        <p:style>
+          <a:lnRef idx="2">
+            <a:schemeClr val="accent1">
+              <a:shade val="50000"/>
+            </a:schemeClr>
+          </a:lnRef>
+          <a:fillRef idx="1">
+            <a:schemeClr val="accent1"/>
+          </a:fillRef>
+          <a:effectRef idx="0">
+            <a:schemeClr val="accent1"/>
+          </a:effectRef>
+          <a:fontRef idx="minor">
+            <a:schemeClr val="lt1"/>
+          </a:fontRef>
+        </p:style>
+        <p:txBody>
+          <a:bodyPr rtlCol="0" anchor="ctr"/>
+          <a:lstStyle/>
+          <a:p>
+            <a:pPr algn="ctr"/>
+            <a:endParaRPr lang="en-CA"/>
+          </a:p>
+        </p:txBody>
+      </p:sp>
+      <p:sp>
+        <p:nvSpPr>
+          <p:cNvPr id="16" name="Arrow: Down 15"/>
+          <p:cNvSpPr/>
+          <p:nvPr/>
+        </p:nvSpPr>
+        <p:spPr>
+          <a:xfrm>
+            <a:off x="6989601" y="1196752"/>
+            <a:ext cx="462719" cy="504056"/>
+          </a:xfrm>
+          <a:prstGeom prst="downArrow">
+            <a:avLst/>
+          </a:prstGeom>
+          <a:solidFill>
+            <a:srgbClr val="E80000">
+              <a:alpha val="61176"/>
+            </a:srgbClr>
+          </a:solidFill>
+        </p:spPr>
+        <p:style>
+          <a:lnRef idx="2">
+            <a:schemeClr val="accent1">
+              <a:shade val="50000"/>
+            </a:schemeClr>
+          </a:lnRef>
+          <a:fillRef idx="1">
+            <a:schemeClr val="accent1"/>
+          </a:fillRef>
+          <a:effectRef idx="0">
+            <a:schemeClr val="accent1"/>
+          </a:effectRef>
+          <a:fontRef idx="minor">
+            <a:schemeClr val="lt1"/>
+          </a:fontRef>
+        </p:style>
+        <p:txBody>
+          <a:bodyPr rtlCol="0" anchor="ctr"/>
+          <a:lstStyle/>
+          <a:p>
+            <a:pPr algn="ctr"/>
+            <a:endParaRPr lang="en-CA"/>
+          </a:p>
+        </p:txBody>
+      </p:sp>
+      <p:sp>
+        <p:nvSpPr>
+          <p:cNvPr id="17" name="Arrow: Right 16"/>
+          <p:cNvSpPr/>
+          <p:nvPr/>
+        </p:nvSpPr>
+        <p:spPr>
+          <a:xfrm>
+            <a:off x="6989601" y="3987062"/>
+            <a:ext cx="688767" cy="612068"/>
+          </a:xfrm>
+          <a:prstGeom prst="rightArrow">
+            <a:avLst/>
+          </a:prstGeom>
+        </p:spPr>
+        <p:style>
+          <a:lnRef idx="2">
+            <a:schemeClr val="accent1">
+              <a:shade val="50000"/>
+            </a:schemeClr>
+          </a:lnRef>
+          <a:fillRef idx="1">
+            <a:schemeClr val="accent1"/>
+          </a:fillRef>
+          <a:effectRef idx="0">
+            <a:schemeClr val="accent1"/>
+          </a:effectRef>
+          <a:fontRef idx="minor">
+            <a:schemeClr val="lt1"/>
+          </a:fontRef>
+        </p:style>
+        <p:txBody>
+          <a:bodyPr rtlCol="0" anchor="ctr"/>
+          <a:lstStyle/>
+          <a:p>
+            <a:pPr algn="ctr"/>
+            <a:endParaRPr lang="en-CA"/>
+          </a:p>
+        </p:txBody>
+      </p:sp>
+      <p:sp>
+        <p:nvSpPr>
+          <p:cNvPr id="18" name="Arrow: Down 17"/>
+          <p:cNvSpPr/>
+          <p:nvPr/>
+        </p:nvSpPr>
+        <p:spPr>
+          <a:xfrm rot="1644745">
+            <a:off x="6184763" y="2883421"/>
+            <a:ext cx="633364" cy="553955"/>
+          </a:xfrm>
+          <a:prstGeom prst="downArrow">
+            <a:avLst/>
+          </a:prstGeom>
+        </p:spPr>
+        <p:style>
+          <a:lnRef idx="2">
+            <a:schemeClr val="accent1">
+              <a:shade val="50000"/>
+            </a:schemeClr>
+          </a:lnRef>
+          <a:fillRef idx="1">
+            <a:schemeClr val="accent1"/>
+          </a:fillRef>
+          <a:effectRef idx="0">
+            <a:schemeClr val="accent1"/>
+          </a:effectRef>
+          <a:fontRef idx="minor">
+            <a:schemeClr val="lt1"/>
+          </a:fontRef>
+        </p:style>
+        <p:txBody>
+          <a:bodyPr rtlCol="0" anchor="ctr"/>
+          <a:lstStyle/>
+          <a:p>
+            <a:pPr algn="ctr"/>
+            <a:endParaRPr lang="en-CA"/>
+          </a:p>
+        </p:txBody>
+      </p:sp>
+      <p:pic>
+        <p:nvPicPr>
+          <p:cNvPr id="20" name="Picture 19"/>
+          <p:cNvPicPr>
+            <a:picLocks noChangeAspect="1"/>
+          </p:cNvPicPr>
+          <p:nvPr/>
+        </p:nvPicPr>
+        <p:blipFill>
+          <a:blip r:embed="rId6" cstate="print">
+            <a:extLst>
+              <a:ext uri="{28A0092B-C50C-407E-A947-70E740481C1C}">
+                <a14:useLocalDpi xmlns:a14="http://schemas.microsoft.com/office/drawing/2010/main" val="0"/>
+              </a:ext>
+            </a:extLst>
+          </a:blip>
+          <a:stretch>
+            <a:fillRect/>
+          </a:stretch>
+        </p:blipFill>
+        <p:spPr>
+          <a:xfrm>
+            <a:off x="6092803" y="5269789"/>
+            <a:ext cx="1709936" cy="1574566"/>
+          </a:xfrm>
+          <a:prstGeom prst="rect">
+            <a:avLst/>
+          </a:prstGeom>
+        </p:spPr>
+      </p:pic>
+      <p:sp>
+        <p:nvSpPr>
+          <p:cNvPr id="21" name="Arrow: Down 20"/>
+          <p:cNvSpPr/>
+          <p:nvPr/>
+        </p:nvSpPr>
+        <p:spPr>
+          <a:xfrm rot="1644745">
+            <a:off x="7611655" y="5051685"/>
+            <a:ext cx="633364" cy="553955"/>
+          </a:xfrm>
+          <a:prstGeom prst="downArrow">
+            <a:avLst/>
+          </a:prstGeom>
+        </p:spPr>
+        <p:style>
+          <a:lnRef idx="2">
+            <a:schemeClr val="accent1">
+              <a:shade val="50000"/>
+            </a:schemeClr>
+          </a:lnRef>
+          <a:fillRef idx="1">
+            <a:schemeClr val="accent1"/>
+          </a:fillRef>
+          <a:effectRef idx="0">
+            <a:schemeClr val="accent1"/>
+          </a:effectRef>
+          <a:fontRef idx="minor">
+            <a:schemeClr val="lt1"/>
+          </a:fontRef>
+        </p:style>
+        <p:txBody>
+          <a:bodyPr rtlCol="0" anchor="ctr"/>
+          <a:lstStyle/>
+          <a:p>
+            <a:pPr algn="ctr"/>
+            <a:endParaRPr lang="en-CA"/>
           </a:p>
         </p:txBody>
       </p:sp>

</xml_diff>